<commit_message>
Camille - DIAPO MAJ
 Modif page lien en ligne
</commit_message>
<xml_diff>
--- a/DIAPO.pptx
+++ b/DIAPO.pptx
@@ -28,12 +28,11 @@
     <p:sldId id="293" r:id="rId22"/>
     <p:sldId id="294" r:id="rId23"/>
     <p:sldId id="295" r:id="rId24"/>
-    <p:sldId id="276" r:id="rId25"/>
-    <p:sldId id="277" r:id="rId26"/>
-    <p:sldId id="278" r:id="rId27"/>
-    <p:sldId id="281" r:id="rId28"/>
-    <p:sldId id="279" r:id="rId29"/>
-    <p:sldId id="280" r:id="rId30"/>
+    <p:sldId id="277" r:id="rId25"/>
+    <p:sldId id="278" r:id="rId26"/>
+    <p:sldId id="281" r:id="rId27"/>
+    <p:sldId id="279" r:id="rId28"/>
+    <p:sldId id="280" r:id="rId29"/>
   </p:sldIdLst>
   <p:sldSz cx="12192000" cy="6858000"/>
   <p:notesSz cx="6858000" cy="9144000"/>
@@ -13379,8 +13378,8 @@
         </p:nvSpPr>
         <p:spPr>
           <a:xfrm>
-            <a:off x="3630891" y="3648909"/>
-            <a:ext cx="4930218" cy="523220"/>
+            <a:off x="2603369" y="2875915"/>
+            <a:ext cx="6766874" cy="1815882"/>
           </a:xfrm>
           <a:prstGeom prst="rect">
             <a:avLst/>
@@ -13393,6 +13392,7 @@
           </a:bodyPr>
           <a:lstStyle/>
           <a:p>
+            <a:pPr algn="ctr"/>
             <a:r>
               <a:rPr lang="fr-FR" sz="2800" dirty="0">
                 <a:latin typeface="Helvetica" panose="020B0604020202030204" pitchFamily="34" charset="0"/>
@@ -13411,12 +13411,40 @@
               <a:latin typeface="Helvetica" panose="020B0604020202030204" pitchFamily="34" charset="0"/>
             </a:endParaRPr>
           </a:p>
+          <a:p>
+            <a:pPr algn="ctr"/>
+            <a:endParaRPr lang="fr-FR" sz="2800" dirty="0">
+              <a:latin typeface="Helvetica" panose="020B0604020202030204" pitchFamily="34" charset="0"/>
+            </a:endParaRPr>
+          </a:p>
+          <a:p>
+            <a:pPr algn="ctr"/>
+            <a:r>
+              <a:rPr lang="fr-FR" sz="2800" dirty="0">
+                <a:latin typeface="Helvetica" panose="020B0604020202030204" pitchFamily="34" charset="0"/>
+              </a:rPr>
+              <a:t>Accessible en ligne</a:t>
+            </a:r>
+          </a:p>
+          <a:p>
+            <a:pPr algn="ctr"/>
+            <a:r>
+              <a:rPr lang="fr-FR" sz="2800" dirty="0" err="1">
+                <a:latin typeface="Helvetica" panose="020B0604020202030204" pitchFamily="34" charset="0"/>
+                <a:hlinkClick r:id="rId5"/>
+              </a:rPr>
+              <a:t>U’pop</a:t>
+            </a:r>
+            <a:endParaRPr lang="fr-FR" sz="2800" dirty="0">
+              <a:latin typeface="Helvetica" panose="020B0604020202030204" pitchFamily="34" charset="0"/>
+            </a:endParaRPr>
+          </a:p>
         </p:txBody>
       </p:sp>
     </p:spTree>
     <p:extLst>
       <p:ext uri="{BB962C8B-B14F-4D97-AF65-F5344CB8AC3E}">
-        <p14:creationId xmlns:p14="http://schemas.microsoft.com/office/powerpoint/2010/main" val="2585678089"/>
+        <p14:creationId xmlns:p14="http://schemas.microsoft.com/office/powerpoint/2010/main" val="1200531869"/>
       </p:ext>
     </p:extLst>
   </p:cSld>
@@ -13565,7 +13593,7 @@
               <a:avLst/>
             </a:prstGeom>
             <a:solidFill>
-              <a:srgbClr val="FED449"/>
+              <a:srgbClr val="88CE62"/>
             </a:solidFill>
             <a:ln>
               <a:solidFill>
@@ -13766,7 +13794,7 @@
               <a:avLst/>
             </a:prstGeom>
             <a:solidFill>
-              <a:srgbClr val="88CE62"/>
+              <a:srgbClr val="FED449"/>
             </a:solidFill>
             <a:ln>
               <a:solidFill>
@@ -13895,10 +13923,10 @@
       </p:sp>
       <p:sp>
         <p:nvSpPr>
-          <p:cNvPr id="2" name="ZoneTexte 1">
+          <p:cNvPr id="11" name="ZoneTexte 10">
             <a:extLst>
               <a:ext uri="{FF2B5EF4-FFF2-40B4-BE49-F238E27FC236}">
-                <a16:creationId xmlns:a16="http://schemas.microsoft.com/office/drawing/2014/main" id="{375A52F9-612E-4E94-BC85-FDFCE2711101}"/>
+                <a16:creationId xmlns:a16="http://schemas.microsoft.com/office/drawing/2014/main" id="{4D68F34E-6148-422D-8C78-F40C2B9BADFF}"/>
               </a:ext>
             </a:extLst>
           </p:cNvPr>
@@ -13907,8 +13935,8 @@
         </p:nvSpPr>
         <p:spPr>
           <a:xfrm>
-            <a:off x="2603369" y="2875915"/>
-            <a:ext cx="6766874" cy="1815882"/>
+            <a:off x="1090367" y="1674695"/>
+            <a:ext cx="10011266" cy="4278094"/>
           </a:xfrm>
           <a:prstGeom prst="rect">
             <a:avLst/>
@@ -13923,43 +13951,86 @@
           <a:p>
             <a:pPr algn="ctr"/>
             <a:r>
-              <a:rPr lang="fr-FR" sz="2800" dirty="0">
+              <a:rPr lang="fr-FR" sz="2800" b="1" dirty="0">
+                <a:latin typeface="Helvetica" panose="020B0604020202030204" pitchFamily="34" charset="0"/>
+                <a:cs typeface="Arial" panose="020B0604020202020204" pitchFamily="34" charset="0"/>
+              </a:rPr>
+              <a:t>CONCLUSION</a:t>
+            </a:r>
+          </a:p>
+          <a:p>
+            <a:pPr algn="ctr"/>
+            <a:endParaRPr lang="fr-FR" sz="2800" b="1" dirty="0">
+              <a:latin typeface="Helvetica" panose="020B0604020202030204" pitchFamily="34" charset="0"/>
+              <a:cs typeface="Arial" panose="020B0604020202020204" pitchFamily="34" charset="0"/>
+            </a:endParaRPr>
+          </a:p>
+          <a:p>
+            <a:r>
+              <a:rPr lang="fr-FR" sz="2400" dirty="0">
                 <a:latin typeface="Helvetica" panose="020B0604020202030204" pitchFamily="34" charset="0"/>
               </a:rPr>
-              <a:t>Accessible en ligne</a:t>
+              <a:t>Cohésion du groupe + Bonne ambiance = Travail productif</a:t>
             </a:r>
           </a:p>
           <a:p>
-            <a:pPr algn="ctr"/>
-            <a:endParaRPr lang="fr-FR" sz="2800" dirty="0">
+            <a:endParaRPr lang="fr-FR" sz="2400" dirty="0">
               <a:latin typeface="Helvetica" panose="020B0604020202030204" pitchFamily="34" charset="0"/>
             </a:endParaRPr>
           </a:p>
           <a:p>
-            <a:pPr algn="ctr"/>
-            <a:endParaRPr lang="fr-FR" sz="2800" dirty="0">
+            <a:r>
+              <a:rPr lang="fr-FR" sz="2400" dirty="0">
+                <a:latin typeface="Helvetica" panose="020B0604020202030204" pitchFamily="34" charset="0"/>
+              </a:rPr>
+              <a:t>Diversité des profils = Complémentarité</a:t>
+            </a:r>
+          </a:p>
+          <a:p>
+            <a:endParaRPr lang="fr-FR" sz="2400" dirty="0">
               <a:latin typeface="Helvetica" panose="020B0604020202030204" pitchFamily="34" charset="0"/>
             </a:endParaRPr>
           </a:p>
           <a:p>
-            <a:pPr algn="ctr"/>
             <a:r>
-              <a:rPr lang="fr-FR" sz="2800">
+              <a:rPr lang="fr-FR" sz="2400" dirty="0">
                 <a:latin typeface="Helvetica" panose="020B0604020202030204" pitchFamily="34" charset="0"/>
-                <a:hlinkClick r:id="rId4"/>
               </a:rPr>
-              <a:t>U’pop</a:t>
+              <a:t>Utilisation de GitHub</a:t>
             </a:r>
-            <a:endParaRPr lang="fr-FR" sz="2800" dirty="0">
+          </a:p>
+          <a:p>
+            <a:endParaRPr lang="fr-FR" sz="2400" dirty="0">
               <a:latin typeface="Helvetica" panose="020B0604020202030204" pitchFamily="34" charset="0"/>
             </a:endParaRPr>
+          </a:p>
+          <a:p>
+            <a:r>
+              <a:rPr lang="fr-FR" sz="2400" dirty="0">
+                <a:latin typeface="Helvetica" panose="020B0604020202030204" pitchFamily="34" charset="0"/>
+              </a:rPr>
+              <a:t>Adaptation à un nouveau langage </a:t>
+            </a:r>
+          </a:p>
+          <a:p>
+            <a:endParaRPr lang="fr-FR" sz="2400" dirty="0">
+              <a:latin typeface="Helvetica" panose="020B0604020202030204" pitchFamily="34" charset="0"/>
+            </a:endParaRPr>
+          </a:p>
+          <a:p>
+            <a:r>
+              <a:rPr lang="fr-FR" sz="2400" dirty="0">
+                <a:latin typeface="Helvetica" panose="020B0604020202030204" pitchFamily="34" charset="0"/>
+              </a:rPr>
+              <a:t>Indentation et commentaires</a:t>
+            </a:r>
           </a:p>
         </p:txBody>
       </p:sp>
     </p:spTree>
     <p:extLst>
       <p:ext uri="{BB962C8B-B14F-4D97-AF65-F5344CB8AC3E}">
-        <p14:creationId xmlns:p14="http://schemas.microsoft.com/office/powerpoint/2010/main" val="1200531869"/>
+        <p14:creationId xmlns:p14="http://schemas.microsoft.com/office/powerpoint/2010/main" val="3408514451"/>
       </p:ext>
     </p:extLst>
   </p:cSld>
@@ -14451,7 +14522,7 @@
         <p:spPr>
           <a:xfrm>
             <a:off x="1090367" y="1674695"/>
-            <a:ext cx="10011266" cy="4278094"/>
+            <a:ext cx="10011266" cy="3539430"/>
           </a:xfrm>
           <a:prstGeom prst="rect">
             <a:avLst/>
@@ -14470,7 +14541,7 @@
                 <a:latin typeface="Helvetica" panose="020B0604020202030204" pitchFamily="34" charset="0"/>
                 <a:cs typeface="Arial" panose="020B0604020202020204" pitchFamily="34" charset="0"/>
               </a:rPr>
-              <a:t>CONCLUSION</a:t>
+              <a:t>CE QUE NOUS AURIONS PU MIEUX FAIRE</a:t>
             </a:r>
           </a:p>
           <a:p>
@@ -14485,7 +14556,7 @@
               <a:rPr lang="fr-FR" sz="2400" dirty="0">
                 <a:latin typeface="Helvetica" panose="020B0604020202030204" pitchFamily="34" charset="0"/>
               </a:rPr>
-              <a:t>Cohésion du groupe + Bonne ambiance = Travail productif</a:t>
+              <a:t>Utiliser la méthode AGILE dès le début</a:t>
             </a:r>
           </a:p>
           <a:p>
@@ -14498,7 +14569,7 @@
               <a:rPr lang="fr-FR" sz="2400" dirty="0">
                 <a:latin typeface="Helvetica" panose="020B0604020202030204" pitchFamily="34" charset="0"/>
               </a:rPr>
-              <a:t>Diversité des profils = Complémentarité</a:t>
+              <a:t>Uniformisation des codes</a:t>
             </a:r>
           </a:p>
           <a:p>
@@ -14511,7 +14582,7 @@
               <a:rPr lang="fr-FR" sz="2400" dirty="0">
                 <a:latin typeface="Helvetica" panose="020B0604020202030204" pitchFamily="34" charset="0"/>
               </a:rPr>
-              <a:t>Utilisation de GitHub</a:t>
+              <a:t>Optimisation des fichiers</a:t>
             </a:r>
           </a:p>
           <a:p>
@@ -14520,32 +14591,16 @@
             </a:endParaRPr>
           </a:p>
           <a:p>
-            <a:r>
-              <a:rPr lang="fr-FR" sz="2400" dirty="0">
-                <a:latin typeface="Helvetica" panose="020B0604020202030204" pitchFamily="34" charset="0"/>
-              </a:rPr>
-              <a:t>Adaptation à un nouveau langage </a:t>
-            </a:r>
-          </a:p>
-          <a:p>
             <a:endParaRPr lang="fr-FR" sz="2400" dirty="0">
               <a:latin typeface="Helvetica" panose="020B0604020202030204" pitchFamily="34" charset="0"/>
             </a:endParaRPr>
-          </a:p>
-          <a:p>
-            <a:r>
-              <a:rPr lang="fr-FR" sz="2400" dirty="0">
-                <a:latin typeface="Helvetica" panose="020B0604020202030204" pitchFamily="34" charset="0"/>
-              </a:rPr>
-              <a:t>Indentation et commentaires</a:t>
-            </a:r>
           </a:p>
         </p:txBody>
       </p:sp>
     </p:spTree>
     <p:extLst>
       <p:ext uri="{BB962C8B-B14F-4D97-AF65-F5344CB8AC3E}">
-        <p14:creationId xmlns:p14="http://schemas.microsoft.com/office/powerpoint/2010/main" val="3408514451"/>
+        <p14:creationId xmlns:p14="http://schemas.microsoft.com/office/powerpoint/2010/main" val="2557336589"/>
       </p:ext>
     </p:extLst>
   </p:cSld>
@@ -15027,576 +15082,6 @@
           <p:cNvPr id="11" name="ZoneTexte 10">
             <a:extLst>
               <a:ext uri="{FF2B5EF4-FFF2-40B4-BE49-F238E27FC236}">
-                <a16:creationId xmlns:a16="http://schemas.microsoft.com/office/drawing/2014/main" id="{4D68F34E-6148-422D-8C78-F40C2B9BADFF}"/>
-              </a:ext>
-            </a:extLst>
-          </p:cNvPr>
-          <p:cNvSpPr txBox="1"/>
-          <p:nvPr/>
-        </p:nvSpPr>
-        <p:spPr>
-          <a:xfrm>
-            <a:off x="1090367" y="1674695"/>
-            <a:ext cx="10011266" cy="3539430"/>
-          </a:xfrm>
-          <a:prstGeom prst="rect">
-            <a:avLst/>
-          </a:prstGeom>
-          <a:noFill/>
-        </p:spPr>
-        <p:txBody>
-          <a:bodyPr wrap="square" rtlCol="0">
-            <a:spAutoFit/>
-          </a:bodyPr>
-          <a:lstStyle/>
-          <a:p>
-            <a:pPr algn="ctr"/>
-            <a:r>
-              <a:rPr lang="fr-FR" sz="2800" b="1" dirty="0">
-                <a:latin typeface="Helvetica" panose="020B0604020202030204" pitchFamily="34" charset="0"/>
-                <a:cs typeface="Arial" panose="020B0604020202020204" pitchFamily="34" charset="0"/>
-              </a:rPr>
-              <a:t>CE QUE NOUS AURIONS PU MIEUX FAIRE</a:t>
-            </a:r>
-          </a:p>
-          <a:p>
-            <a:pPr algn="ctr"/>
-            <a:endParaRPr lang="fr-FR" sz="2800" b="1" dirty="0">
-              <a:latin typeface="Helvetica" panose="020B0604020202030204" pitchFamily="34" charset="0"/>
-              <a:cs typeface="Arial" panose="020B0604020202020204" pitchFamily="34" charset="0"/>
-            </a:endParaRPr>
-          </a:p>
-          <a:p>
-            <a:r>
-              <a:rPr lang="fr-FR" sz="2400" dirty="0">
-                <a:latin typeface="Helvetica" panose="020B0604020202030204" pitchFamily="34" charset="0"/>
-              </a:rPr>
-              <a:t>Utiliser la méthode à Gilles (AGILE) dès le début</a:t>
-            </a:r>
-          </a:p>
-          <a:p>
-            <a:endParaRPr lang="fr-FR" sz="2400" dirty="0">
-              <a:latin typeface="Helvetica" panose="020B0604020202030204" pitchFamily="34" charset="0"/>
-            </a:endParaRPr>
-          </a:p>
-          <a:p>
-            <a:r>
-              <a:rPr lang="fr-FR" sz="2400" dirty="0">
-                <a:latin typeface="Helvetica" panose="020B0604020202030204" pitchFamily="34" charset="0"/>
-              </a:rPr>
-              <a:t>Uniformisation des codes</a:t>
-            </a:r>
-          </a:p>
-          <a:p>
-            <a:endParaRPr lang="fr-FR" sz="2400" dirty="0">
-              <a:latin typeface="Helvetica" panose="020B0604020202030204" pitchFamily="34" charset="0"/>
-            </a:endParaRPr>
-          </a:p>
-          <a:p>
-            <a:r>
-              <a:rPr lang="fr-FR" sz="2400" dirty="0">
-                <a:latin typeface="Helvetica" panose="020B0604020202030204" pitchFamily="34" charset="0"/>
-              </a:rPr>
-              <a:t>Optimisation des fichiers</a:t>
-            </a:r>
-          </a:p>
-          <a:p>
-            <a:endParaRPr lang="fr-FR" sz="2400" dirty="0">
-              <a:latin typeface="Helvetica" panose="020B0604020202030204" pitchFamily="34" charset="0"/>
-            </a:endParaRPr>
-          </a:p>
-          <a:p>
-            <a:endParaRPr lang="fr-FR" sz="2400" dirty="0">
-              <a:latin typeface="Helvetica" panose="020B0604020202030204" pitchFamily="34" charset="0"/>
-            </a:endParaRPr>
-          </a:p>
-        </p:txBody>
-      </p:sp>
-    </p:spTree>
-    <p:extLst>
-      <p:ext uri="{BB962C8B-B14F-4D97-AF65-F5344CB8AC3E}">
-        <p14:creationId xmlns:p14="http://schemas.microsoft.com/office/powerpoint/2010/main" val="2557336589"/>
-      </p:ext>
-    </p:extLst>
-  </p:cSld>
-  <p:clrMapOvr>
-    <a:masterClrMapping/>
-  </p:clrMapOvr>
-</p:sld>
-</file>
-
-<file path=ppt/slides/slide28.xml><?xml version="1.0" encoding="utf-8"?>
-<p:sld xmlns:a="http://schemas.openxmlformats.org/drawingml/2006/main" xmlns:r="http://schemas.openxmlformats.org/officeDocument/2006/relationships" xmlns:p="http://schemas.openxmlformats.org/presentationml/2006/main">
-  <p:cSld>
-    <p:bg>
-      <p:bgPr>
-        <a:blipFill dpi="0" rotWithShape="1">
-          <a:blip r:embed="rId2">
-            <a:lum/>
-          </a:blip>
-          <a:srcRect/>
-          <a:stretch>
-            <a:fillRect/>
-          </a:stretch>
-        </a:blipFill>
-        <a:effectLst/>
-      </p:bgPr>
-    </p:bg>
-    <p:spTree>
-      <p:nvGrpSpPr>
-        <p:cNvPr id="1" name=""/>
-        <p:cNvGrpSpPr/>
-        <p:nvPr/>
-      </p:nvGrpSpPr>
-      <p:grpSpPr>
-        <a:xfrm>
-          <a:off x="0" y="0"/>
-          <a:ext cx="0" cy="0"/>
-          <a:chOff x="0" y="0"/>
-          <a:chExt cx="0" cy="0"/>
-        </a:xfrm>
-      </p:grpSpPr>
-      <p:grpSp>
-        <p:nvGrpSpPr>
-          <p:cNvPr id="7" name="Groupe 6">
-            <a:extLst>
-              <a:ext uri="{FF2B5EF4-FFF2-40B4-BE49-F238E27FC236}">
-                <a16:creationId xmlns:a16="http://schemas.microsoft.com/office/drawing/2014/main" id="{67E81936-583F-45AD-82CC-A5C937F4C87C}"/>
-              </a:ext>
-            </a:extLst>
-          </p:cNvPr>
-          <p:cNvGrpSpPr/>
-          <p:nvPr/>
-        </p:nvGrpSpPr>
-        <p:grpSpPr>
-          <a:xfrm>
-            <a:off x="327166" y="0"/>
-            <a:ext cx="11251304" cy="1342417"/>
-            <a:chOff x="327166" y="0"/>
-            <a:chExt cx="11251304" cy="1342417"/>
-          </a:xfrm>
-        </p:grpSpPr>
-        <p:sp>
-          <p:nvSpPr>
-            <p:cNvPr id="4" name="Flèche : chevron 3">
-              <a:extLst>
-                <a:ext uri="{FF2B5EF4-FFF2-40B4-BE49-F238E27FC236}">
-                  <a16:creationId xmlns:a16="http://schemas.microsoft.com/office/drawing/2014/main" id="{60D600DE-6FA0-4280-A81A-6DBE7691E92C}"/>
-                </a:ext>
-              </a:extLst>
-            </p:cNvPr>
-            <p:cNvSpPr/>
-            <p:nvPr/>
-          </p:nvSpPr>
-          <p:spPr>
-            <a:xfrm>
-              <a:off x="1268691" y="332278"/>
-              <a:ext cx="2309567" cy="688157"/>
-            </a:xfrm>
-            <a:prstGeom prst="chevron">
-              <a:avLst/>
-            </a:prstGeom>
-            <a:solidFill>
-              <a:srgbClr val="FED449"/>
-            </a:solidFill>
-            <a:ln>
-              <a:solidFill>
-                <a:schemeClr val="bg1"/>
-              </a:solidFill>
-            </a:ln>
-          </p:spPr>
-          <p:style>
-            <a:lnRef idx="2">
-              <a:schemeClr val="accent1">
-                <a:shade val="50000"/>
-              </a:schemeClr>
-            </a:lnRef>
-            <a:fillRef idx="1">
-              <a:schemeClr val="accent1"/>
-            </a:fillRef>
-            <a:effectRef idx="0">
-              <a:schemeClr val="accent1"/>
-            </a:effectRef>
-            <a:fontRef idx="minor">
-              <a:schemeClr val="lt1"/>
-            </a:fontRef>
-          </p:style>
-          <p:txBody>
-            <a:bodyPr rtlCol="0" anchor="ctr"/>
-            <a:lstStyle/>
-            <a:p>
-              <a:pPr algn="ctr"/>
-              <a:r>
-                <a:rPr lang="fr-FR" sz="1500" b="1" dirty="0">
-                  <a:solidFill>
-                    <a:schemeClr val="bg1"/>
-                  </a:solidFill>
-                  <a:effectLst>
-                    <a:outerShdw blurRad="38100" dist="76200" dir="2700000" algn="tl">
-                      <a:srgbClr val="000000"/>
-                    </a:outerShdw>
-                  </a:effectLst>
-                  <a:latin typeface="Helvetica" panose="020B0604020202030204" pitchFamily="34" charset="0"/>
-                </a:rPr>
-                <a:t>Etude du projet</a:t>
-              </a:r>
-            </a:p>
-          </p:txBody>
-        </p:sp>
-        <p:sp>
-          <p:nvSpPr>
-            <p:cNvPr id="16" name="Flèche : chevron 15">
-              <a:extLst>
-                <a:ext uri="{FF2B5EF4-FFF2-40B4-BE49-F238E27FC236}">
-                  <a16:creationId xmlns:a16="http://schemas.microsoft.com/office/drawing/2014/main" id="{F7655D32-22EC-4542-883E-4033865C1471}"/>
-                </a:ext>
-              </a:extLst>
-            </p:cNvPr>
-            <p:cNvSpPr/>
-            <p:nvPr/>
-          </p:nvSpPr>
-          <p:spPr>
-            <a:xfrm>
-              <a:off x="9268903" y="332277"/>
-              <a:ext cx="2309567" cy="688157"/>
-            </a:xfrm>
-            <a:prstGeom prst="chevron">
-              <a:avLst/>
-            </a:prstGeom>
-            <a:solidFill>
-              <a:srgbClr val="88CE62"/>
-            </a:solidFill>
-            <a:ln>
-              <a:solidFill>
-                <a:schemeClr val="bg1"/>
-              </a:solidFill>
-            </a:ln>
-          </p:spPr>
-          <p:style>
-            <a:lnRef idx="2">
-              <a:schemeClr val="accent1">
-                <a:shade val="50000"/>
-              </a:schemeClr>
-            </a:lnRef>
-            <a:fillRef idx="1">
-              <a:schemeClr val="accent1"/>
-            </a:fillRef>
-            <a:effectRef idx="0">
-              <a:schemeClr val="accent1"/>
-            </a:effectRef>
-            <a:fontRef idx="minor">
-              <a:schemeClr val="lt1"/>
-            </a:fontRef>
-          </p:style>
-          <p:txBody>
-            <a:bodyPr rtlCol="0" anchor="ctr"/>
-            <a:lstStyle/>
-            <a:p>
-              <a:pPr algn="ctr"/>
-              <a:r>
-                <a:rPr lang="fr-FR" sz="1600" b="1" dirty="0">
-                  <a:solidFill>
-                    <a:schemeClr val="bg1"/>
-                  </a:solidFill>
-                  <a:effectLst>
-                    <a:outerShdw blurRad="38100" dist="76200" dir="2700000" algn="tl">
-                      <a:srgbClr val="000000"/>
-                    </a:outerShdw>
-                  </a:effectLst>
-                  <a:latin typeface="Helvetica" panose="020B0604020202030204" pitchFamily="34" charset="0"/>
-                </a:rPr>
-                <a:t>Conclusion</a:t>
-              </a:r>
-            </a:p>
-          </p:txBody>
-        </p:sp>
-        <p:sp>
-          <p:nvSpPr>
-            <p:cNvPr id="17" name="Flèche : chevron 16">
-              <a:extLst>
-                <a:ext uri="{FF2B5EF4-FFF2-40B4-BE49-F238E27FC236}">
-                  <a16:creationId xmlns:a16="http://schemas.microsoft.com/office/drawing/2014/main" id="{30C36617-CB5C-40F8-B05D-7053886FD5EF}"/>
-                </a:ext>
-              </a:extLst>
-            </p:cNvPr>
-            <p:cNvSpPr/>
-            <p:nvPr/>
-          </p:nvSpPr>
-          <p:spPr>
-            <a:xfrm>
-              <a:off x="3268744" y="332277"/>
-              <a:ext cx="2309567" cy="688157"/>
-            </a:xfrm>
-            <a:prstGeom prst="chevron">
-              <a:avLst/>
-            </a:prstGeom>
-            <a:solidFill>
-              <a:srgbClr val="FED449"/>
-            </a:solidFill>
-            <a:ln>
-              <a:solidFill>
-                <a:schemeClr val="bg1"/>
-              </a:solidFill>
-            </a:ln>
-          </p:spPr>
-          <p:style>
-            <a:lnRef idx="2">
-              <a:schemeClr val="accent1">
-                <a:shade val="50000"/>
-              </a:schemeClr>
-            </a:lnRef>
-            <a:fillRef idx="1">
-              <a:schemeClr val="accent1"/>
-            </a:fillRef>
-            <a:effectRef idx="0">
-              <a:schemeClr val="accent1"/>
-            </a:effectRef>
-            <a:fontRef idx="minor">
-              <a:schemeClr val="lt1"/>
-            </a:fontRef>
-          </p:style>
-          <p:txBody>
-            <a:bodyPr rtlCol="0" anchor="ctr"/>
-            <a:lstStyle/>
-            <a:p>
-              <a:pPr algn="ctr"/>
-              <a:r>
-                <a:rPr lang="fr-FR" sz="1500" b="1" dirty="0">
-                  <a:solidFill>
-                    <a:schemeClr val="bg1"/>
-                  </a:solidFill>
-                  <a:effectLst>
-                    <a:outerShdw blurRad="38100" dist="76200" dir="2700000" algn="tl">
-                      <a:srgbClr val="000000"/>
-                    </a:outerShdw>
-                  </a:effectLst>
-                  <a:latin typeface="Helvetica" panose="020B0604020202030204" pitchFamily="34" charset="0"/>
-                </a:rPr>
-                <a:t>Organisation</a:t>
-              </a:r>
-            </a:p>
-          </p:txBody>
-        </p:sp>
-        <p:sp>
-          <p:nvSpPr>
-            <p:cNvPr id="18" name="Flèche : chevron 17">
-              <a:extLst>
-                <a:ext uri="{FF2B5EF4-FFF2-40B4-BE49-F238E27FC236}">
-                  <a16:creationId xmlns:a16="http://schemas.microsoft.com/office/drawing/2014/main" id="{A33478E5-51C7-4324-9E5C-0845E032CF0C}"/>
-                </a:ext>
-              </a:extLst>
-            </p:cNvPr>
-            <p:cNvSpPr/>
-            <p:nvPr/>
-          </p:nvSpPr>
-          <p:spPr>
-            <a:xfrm>
-              <a:off x="5268797" y="332704"/>
-              <a:ext cx="2309567" cy="688157"/>
-            </a:xfrm>
-            <a:prstGeom prst="chevron">
-              <a:avLst/>
-            </a:prstGeom>
-            <a:solidFill>
-              <a:srgbClr val="FED449"/>
-            </a:solidFill>
-            <a:ln>
-              <a:solidFill>
-                <a:schemeClr val="bg1"/>
-              </a:solidFill>
-            </a:ln>
-          </p:spPr>
-          <p:style>
-            <a:lnRef idx="2">
-              <a:schemeClr val="accent1">
-                <a:shade val="50000"/>
-              </a:schemeClr>
-            </a:lnRef>
-            <a:fillRef idx="1">
-              <a:schemeClr val="accent1"/>
-            </a:fillRef>
-            <a:effectRef idx="0">
-              <a:schemeClr val="accent1"/>
-            </a:effectRef>
-            <a:fontRef idx="minor">
-              <a:schemeClr val="lt1"/>
-            </a:fontRef>
-          </p:style>
-          <p:txBody>
-            <a:bodyPr rtlCol="0" anchor="ctr"/>
-            <a:lstStyle/>
-            <a:p>
-              <a:pPr algn="ctr"/>
-              <a:r>
-                <a:rPr lang="fr-FR" sz="1500" b="1" dirty="0">
-                  <a:solidFill>
-                    <a:schemeClr val="bg1"/>
-                  </a:solidFill>
-                  <a:effectLst>
-                    <a:outerShdw blurRad="38100" dist="76200" dir="2700000" algn="tl">
-                      <a:srgbClr val="000000"/>
-                    </a:outerShdw>
-                  </a:effectLst>
-                  <a:latin typeface="Helvetica" panose="020B0604020202030204" pitchFamily="34" charset="0"/>
-                </a:rPr>
-                <a:t>Développement</a:t>
-              </a:r>
-            </a:p>
-          </p:txBody>
-        </p:sp>
-        <p:sp>
-          <p:nvSpPr>
-            <p:cNvPr id="19" name="Flèche : chevron 18">
-              <a:extLst>
-                <a:ext uri="{FF2B5EF4-FFF2-40B4-BE49-F238E27FC236}">
-                  <a16:creationId xmlns:a16="http://schemas.microsoft.com/office/drawing/2014/main" id="{8795E004-010B-4219-8B10-37FA6D3A7781}"/>
-                </a:ext>
-              </a:extLst>
-            </p:cNvPr>
-            <p:cNvSpPr/>
-            <p:nvPr/>
-          </p:nvSpPr>
-          <p:spPr>
-            <a:xfrm>
-              <a:off x="7268850" y="332703"/>
-              <a:ext cx="2309567" cy="688157"/>
-            </a:xfrm>
-            <a:prstGeom prst="chevron">
-              <a:avLst/>
-            </a:prstGeom>
-            <a:solidFill>
-              <a:srgbClr val="FED449"/>
-            </a:solidFill>
-            <a:ln>
-              <a:solidFill>
-                <a:schemeClr val="bg1"/>
-              </a:solidFill>
-            </a:ln>
-          </p:spPr>
-          <p:style>
-            <a:lnRef idx="2">
-              <a:schemeClr val="accent1">
-                <a:shade val="50000"/>
-              </a:schemeClr>
-            </a:lnRef>
-            <a:fillRef idx="1">
-              <a:schemeClr val="accent1"/>
-            </a:fillRef>
-            <a:effectRef idx="0">
-              <a:schemeClr val="accent1"/>
-            </a:effectRef>
-            <a:fontRef idx="minor">
-              <a:schemeClr val="lt1"/>
-            </a:fontRef>
-          </p:style>
-          <p:txBody>
-            <a:bodyPr rtlCol="0" anchor="ctr"/>
-            <a:lstStyle/>
-            <a:p>
-              <a:pPr algn="ctr"/>
-              <a:r>
-                <a:rPr lang="fr-FR" sz="1500" b="1" dirty="0">
-                  <a:solidFill>
-                    <a:schemeClr val="bg1"/>
-                  </a:solidFill>
-                  <a:effectLst>
-                    <a:outerShdw blurRad="38100" dist="76200" dir="2700000" algn="tl">
-                      <a:srgbClr val="000000"/>
-                    </a:outerShdw>
-                  </a:effectLst>
-                  <a:latin typeface="Helvetica" panose="020B0604020202030204" pitchFamily="34" charset="0"/>
-                </a:rPr>
-                <a:t>Démonstration</a:t>
-              </a:r>
-              <a:endParaRPr lang="fr-FR" sz="1500" dirty="0">
-                <a:solidFill>
-                  <a:schemeClr val="tx1"/>
-                </a:solidFill>
-              </a:endParaRPr>
-            </a:p>
-          </p:txBody>
-        </p:sp>
-        <p:pic>
-          <p:nvPicPr>
-            <p:cNvPr id="6" name="Image 5">
-              <a:extLst>
-                <a:ext uri="{FF2B5EF4-FFF2-40B4-BE49-F238E27FC236}">
-                  <a16:creationId xmlns:a16="http://schemas.microsoft.com/office/drawing/2014/main" id="{2D0A881D-5AC2-4766-BD4C-5405D55C11A5}"/>
-                </a:ext>
-              </a:extLst>
-            </p:cNvPr>
-            <p:cNvPicPr>
-              <a:picLocks noChangeAspect="1"/>
-            </p:cNvPicPr>
-            <p:nvPr/>
-          </p:nvPicPr>
-          <p:blipFill>
-            <a:blip r:embed="rId3">
-              <a:extLst>
-                <a:ext uri="{28A0092B-C50C-407E-A947-70E740481C1C}">
-                  <a14:useLocalDpi xmlns:a14="http://schemas.microsoft.com/office/drawing/2010/main" val="0"/>
-                </a:ext>
-              </a:extLst>
-            </a:blip>
-            <a:stretch>
-              <a:fillRect/>
-            </a:stretch>
-          </p:blipFill>
-          <p:spPr>
-            <a:xfrm>
-              <a:off x="327166" y="0"/>
-              <a:ext cx="1566153" cy="1342417"/>
-            </a:xfrm>
-            <a:prstGeom prst="rect">
-              <a:avLst/>
-            </a:prstGeom>
-          </p:spPr>
-        </p:pic>
-      </p:grpSp>
-      <p:sp>
-        <p:nvSpPr>
-          <p:cNvPr id="10" name="ZoneTexte 9">
-            <a:extLst>
-              <a:ext uri="{FF2B5EF4-FFF2-40B4-BE49-F238E27FC236}">
-                <a16:creationId xmlns:a16="http://schemas.microsoft.com/office/drawing/2014/main" id="{CE36D8FB-1CD3-4D19-A954-A2CE97724692}"/>
-              </a:ext>
-            </a:extLst>
-          </p:cNvPr>
-          <p:cNvSpPr txBox="1"/>
-          <p:nvPr/>
-        </p:nvSpPr>
-        <p:spPr>
-          <a:xfrm>
-            <a:off x="336894" y="1225685"/>
-            <a:ext cx="11472482" cy="5369668"/>
-          </a:xfrm>
-          <a:prstGeom prst="rect">
-            <a:avLst/>
-          </a:prstGeom>
-          <a:solidFill>
-            <a:srgbClr val="FED449">
-              <a:alpha val="50000"/>
-            </a:srgbClr>
-          </a:solidFill>
-          <a:effectLst>
-            <a:softEdge rad="152400"/>
-          </a:effectLst>
-        </p:spPr>
-        <p:txBody>
-          <a:bodyPr wrap="square" rtlCol="0">
-            <a:spAutoFit/>
-          </a:bodyPr>
-          <a:lstStyle/>
-          <a:p>
-            <a:endParaRPr lang="fr-FR" dirty="0"/>
-          </a:p>
-        </p:txBody>
-      </p:sp>
-      <p:sp>
-        <p:nvSpPr>
-          <p:cNvPr id="11" name="ZoneTexte 10">
-            <a:extLst>
-              <a:ext uri="{FF2B5EF4-FFF2-40B4-BE49-F238E27FC236}">
                 <a16:creationId xmlns:a16="http://schemas.microsoft.com/office/drawing/2014/main" id="{C9EBFD3C-EFBF-4D0F-882B-53499E15C08D}"/>
               </a:ext>
             </a:extLst>
@@ -15732,7 +15217,7 @@
 </p:sld>
 </file>
 
-<file path=ppt/slides/slide29.xml><?xml version="1.0" encoding="utf-8"?>
+<file path=ppt/slides/slide28.xml><?xml version="1.0" encoding="utf-8"?>
 <p:sld xmlns:a="http://schemas.openxmlformats.org/drawingml/2006/main" xmlns:r="http://schemas.openxmlformats.org/officeDocument/2006/relationships" xmlns:p="http://schemas.openxmlformats.org/presentationml/2006/main">
   <p:cSld>
     <p:bg>
@@ -23934,7 +23419,7 @@
           <a:graphicData uri="http://schemas.openxmlformats.org/presentationml/2006/ole">
             <mc:AlternateContent xmlns:mc="http://schemas.openxmlformats.org/markup-compatibility/2006">
               <mc:Choice xmlns:v="urn:schemas-microsoft-com:vml" Requires="v">
-                <p:oleObj spid="_x0000_s1072" name="Worksheet" r:id="rId5" imgW="6865398" imgH="1562197" progId="Excel.Sheet.12">
+                <p:oleObj spid="_x0000_s1073" name="Worksheet" r:id="rId5" imgW="6865398" imgH="1562197" progId="Excel.Sheet.12">
                   <p:embed/>
                 </p:oleObj>
               </mc:Choice>

</xml_diff>

<commit_message>
Mat - MCD Diapo
</commit_message>
<xml_diff>
--- a/DIAPO.pptx
+++ b/DIAPO.pptx
@@ -10,7 +10,7 @@
     <p:sldId id="260" r:id="rId4"/>
     <p:sldId id="264" r:id="rId5"/>
     <p:sldId id="262" r:id="rId6"/>
-    <p:sldId id="265" r:id="rId7"/>
+    <p:sldId id="296" r:id="rId7"/>
     <p:sldId id="266" r:id="rId8"/>
     <p:sldId id="268" r:id="rId9"/>
     <p:sldId id="269" r:id="rId10"/>
@@ -21899,6 +21899,773 @@
             <a:bodyPr rtlCol="0" anchor="ctr"/>
             <a:lstStyle/>
             <a:p>
+              <a:pPr marL="0" marR="0" lvl="0" indent="0" algn="ctr" defTabSz="914400" rtl="0" eaLnBrk="1" fontAlgn="auto" latinLnBrk="0" hangingPunct="1">
+                <a:lnSpc>
+                  <a:spcPct val="100000"/>
+                </a:lnSpc>
+                <a:spcBef>
+                  <a:spcPts val="0"/>
+                </a:spcBef>
+                <a:spcAft>
+                  <a:spcPts val="0"/>
+                </a:spcAft>
+                <a:buClrTx/>
+                <a:buSzTx/>
+                <a:buFontTx/>
+                <a:buNone/>
+                <a:tabLst/>
+                <a:defRPr/>
+              </a:pPr>
+              <a:r>
+                <a:rPr kumimoji="0" lang="fr-FR" sz="1500" b="1" i="0" u="none" strike="noStrike" kern="1200" cap="none" spc="0" normalizeH="0" baseline="0" noProof="0" dirty="0">
+                  <a:ln>
+                    <a:noFill/>
+                  </a:ln>
+                  <a:solidFill>
+                    <a:prstClr val="white"/>
+                  </a:solidFill>
+                  <a:effectLst>
+                    <a:outerShdw blurRad="38100" dist="76200" dir="2700000" algn="tl">
+                      <a:srgbClr val="000000"/>
+                    </a:outerShdw>
+                  </a:effectLst>
+                  <a:uLnTx/>
+                  <a:uFillTx/>
+                  <a:latin typeface="Helvetica" panose="020B0604020202030204" pitchFamily="34" charset="0"/>
+                  <a:ea typeface="+mn-ea"/>
+                  <a:cs typeface="+mn-cs"/>
+                </a:rPr>
+                <a:t>Etude du projet</a:t>
+              </a:r>
+            </a:p>
+          </p:txBody>
+        </p:sp>
+        <p:sp>
+          <p:nvSpPr>
+            <p:cNvPr id="16" name="Flèche : chevron 15">
+              <a:extLst>
+                <a:ext uri="{FF2B5EF4-FFF2-40B4-BE49-F238E27FC236}">
+                  <a16:creationId xmlns:a16="http://schemas.microsoft.com/office/drawing/2014/main" id="{F7655D32-22EC-4542-883E-4033865C1471}"/>
+                </a:ext>
+              </a:extLst>
+            </p:cNvPr>
+            <p:cNvSpPr/>
+            <p:nvPr/>
+          </p:nvSpPr>
+          <p:spPr>
+            <a:xfrm>
+              <a:off x="9268903" y="332277"/>
+              <a:ext cx="2309567" cy="688157"/>
+            </a:xfrm>
+            <a:prstGeom prst="chevron">
+              <a:avLst/>
+            </a:prstGeom>
+            <a:solidFill>
+              <a:srgbClr val="FED449"/>
+            </a:solidFill>
+            <a:ln>
+              <a:solidFill>
+                <a:schemeClr val="bg1"/>
+              </a:solidFill>
+            </a:ln>
+          </p:spPr>
+          <p:style>
+            <a:lnRef idx="2">
+              <a:schemeClr val="accent1">
+                <a:shade val="50000"/>
+              </a:schemeClr>
+            </a:lnRef>
+            <a:fillRef idx="1">
+              <a:schemeClr val="accent1"/>
+            </a:fillRef>
+            <a:effectRef idx="0">
+              <a:schemeClr val="accent1"/>
+            </a:effectRef>
+            <a:fontRef idx="minor">
+              <a:schemeClr val="lt1"/>
+            </a:fontRef>
+          </p:style>
+          <p:txBody>
+            <a:bodyPr rtlCol="0" anchor="ctr"/>
+            <a:lstStyle/>
+            <a:p>
+              <a:pPr marL="0" marR="0" lvl="0" indent="0" algn="ctr" defTabSz="914400" rtl="0" eaLnBrk="1" fontAlgn="auto" latinLnBrk="0" hangingPunct="1">
+                <a:lnSpc>
+                  <a:spcPct val="100000"/>
+                </a:lnSpc>
+                <a:spcBef>
+                  <a:spcPts val="0"/>
+                </a:spcBef>
+                <a:spcAft>
+                  <a:spcPts val="0"/>
+                </a:spcAft>
+                <a:buClrTx/>
+                <a:buSzTx/>
+                <a:buFontTx/>
+                <a:buNone/>
+                <a:tabLst/>
+                <a:defRPr/>
+              </a:pPr>
+              <a:r>
+                <a:rPr kumimoji="0" lang="fr-FR" sz="1600" b="1" i="0" u="none" strike="noStrike" kern="1200" cap="none" spc="0" normalizeH="0" baseline="0" noProof="0" dirty="0">
+                  <a:ln>
+                    <a:noFill/>
+                  </a:ln>
+                  <a:solidFill>
+                    <a:prstClr val="white"/>
+                  </a:solidFill>
+                  <a:effectLst>
+                    <a:outerShdw blurRad="38100" dist="76200" dir="2700000" algn="tl">
+                      <a:srgbClr val="000000"/>
+                    </a:outerShdw>
+                  </a:effectLst>
+                  <a:uLnTx/>
+                  <a:uFillTx/>
+                  <a:latin typeface="Helvetica" panose="020B0604020202030204" pitchFamily="34" charset="0"/>
+                  <a:ea typeface="+mn-ea"/>
+                  <a:cs typeface="+mn-cs"/>
+                </a:rPr>
+                <a:t>Conclusion</a:t>
+              </a:r>
+            </a:p>
+          </p:txBody>
+        </p:sp>
+        <p:sp>
+          <p:nvSpPr>
+            <p:cNvPr id="17" name="Flèche : chevron 16">
+              <a:extLst>
+                <a:ext uri="{FF2B5EF4-FFF2-40B4-BE49-F238E27FC236}">
+                  <a16:creationId xmlns:a16="http://schemas.microsoft.com/office/drawing/2014/main" id="{30C36617-CB5C-40F8-B05D-7053886FD5EF}"/>
+                </a:ext>
+              </a:extLst>
+            </p:cNvPr>
+            <p:cNvSpPr/>
+            <p:nvPr/>
+          </p:nvSpPr>
+          <p:spPr>
+            <a:xfrm>
+              <a:off x="3268744" y="332277"/>
+              <a:ext cx="2309567" cy="688157"/>
+            </a:xfrm>
+            <a:prstGeom prst="chevron">
+              <a:avLst/>
+            </a:prstGeom>
+            <a:solidFill>
+              <a:srgbClr val="FED449"/>
+            </a:solidFill>
+            <a:ln>
+              <a:solidFill>
+                <a:schemeClr val="bg1"/>
+              </a:solidFill>
+            </a:ln>
+          </p:spPr>
+          <p:style>
+            <a:lnRef idx="2">
+              <a:schemeClr val="accent1">
+                <a:shade val="50000"/>
+              </a:schemeClr>
+            </a:lnRef>
+            <a:fillRef idx="1">
+              <a:schemeClr val="accent1"/>
+            </a:fillRef>
+            <a:effectRef idx="0">
+              <a:schemeClr val="accent1"/>
+            </a:effectRef>
+            <a:fontRef idx="minor">
+              <a:schemeClr val="lt1"/>
+            </a:fontRef>
+          </p:style>
+          <p:txBody>
+            <a:bodyPr rtlCol="0" anchor="ctr"/>
+            <a:lstStyle/>
+            <a:p>
+              <a:pPr marL="0" marR="0" lvl="0" indent="0" algn="ctr" defTabSz="914400" rtl="0" eaLnBrk="1" fontAlgn="auto" latinLnBrk="0" hangingPunct="1">
+                <a:lnSpc>
+                  <a:spcPct val="100000"/>
+                </a:lnSpc>
+                <a:spcBef>
+                  <a:spcPts val="0"/>
+                </a:spcBef>
+                <a:spcAft>
+                  <a:spcPts val="0"/>
+                </a:spcAft>
+                <a:buClrTx/>
+                <a:buSzTx/>
+                <a:buFontTx/>
+                <a:buNone/>
+                <a:tabLst/>
+                <a:defRPr/>
+              </a:pPr>
+              <a:r>
+                <a:rPr kumimoji="0" lang="fr-FR" sz="1500" b="1" i="0" u="none" strike="noStrike" kern="1200" cap="none" spc="0" normalizeH="0" baseline="0" noProof="0" dirty="0">
+                  <a:ln>
+                    <a:noFill/>
+                  </a:ln>
+                  <a:solidFill>
+                    <a:prstClr val="white"/>
+                  </a:solidFill>
+                  <a:effectLst>
+                    <a:outerShdw blurRad="38100" dist="76200" dir="2700000" algn="tl">
+                      <a:srgbClr val="000000"/>
+                    </a:outerShdw>
+                  </a:effectLst>
+                  <a:uLnTx/>
+                  <a:uFillTx/>
+                  <a:latin typeface="Helvetica" panose="020B0604020202030204" pitchFamily="34" charset="0"/>
+                  <a:ea typeface="+mn-ea"/>
+                  <a:cs typeface="+mn-cs"/>
+                </a:rPr>
+                <a:t>Organisation</a:t>
+              </a:r>
+            </a:p>
+          </p:txBody>
+        </p:sp>
+        <p:sp>
+          <p:nvSpPr>
+            <p:cNvPr id="18" name="Flèche : chevron 17">
+              <a:extLst>
+                <a:ext uri="{FF2B5EF4-FFF2-40B4-BE49-F238E27FC236}">
+                  <a16:creationId xmlns:a16="http://schemas.microsoft.com/office/drawing/2014/main" id="{A33478E5-51C7-4324-9E5C-0845E032CF0C}"/>
+                </a:ext>
+              </a:extLst>
+            </p:cNvPr>
+            <p:cNvSpPr/>
+            <p:nvPr/>
+          </p:nvSpPr>
+          <p:spPr>
+            <a:xfrm>
+              <a:off x="5268797" y="332704"/>
+              <a:ext cx="2309567" cy="688157"/>
+            </a:xfrm>
+            <a:prstGeom prst="chevron">
+              <a:avLst/>
+            </a:prstGeom>
+            <a:solidFill>
+              <a:srgbClr val="FED449"/>
+            </a:solidFill>
+            <a:ln>
+              <a:solidFill>
+                <a:schemeClr val="bg1"/>
+              </a:solidFill>
+            </a:ln>
+          </p:spPr>
+          <p:style>
+            <a:lnRef idx="2">
+              <a:schemeClr val="accent1">
+                <a:shade val="50000"/>
+              </a:schemeClr>
+            </a:lnRef>
+            <a:fillRef idx="1">
+              <a:schemeClr val="accent1"/>
+            </a:fillRef>
+            <a:effectRef idx="0">
+              <a:schemeClr val="accent1"/>
+            </a:effectRef>
+            <a:fontRef idx="minor">
+              <a:schemeClr val="lt1"/>
+            </a:fontRef>
+          </p:style>
+          <p:txBody>
+            <a:bodyPr rtlCol="0" anchor="ctr"/>
+            <a:lstStyle/>
+            <a:p>
+              <a:pPr marL="0" marR="0" lvl="0" indent="0" algn="ctr" defTabSz="914400" rtl="0" eaLnBrk="1" fontAlgn="auto" latinLnBrk="0" hangingPunct="1">
+                <a:lnSpc>
+                  <a:spcPct val="100000"/>
+                </a:lnSpc>
+                <a:spcBef>
+                  <a:spcPts val="0"/>
+                </a:spcBef>
+                <a:spcAft>
+                  <a:spcPts val="0"/>
+                </a:spcAft>
+                <a:buClrTx/>
+                <a:buSzTx/>
+                <a:buFontTx/>
+                <a:buNone/>
+                <a:tabLst/>
+                <a:defRPr/>
+              </a:pPr>
+              <a:r>
+                <a:rPr kumimoji="0" lang="fr-FR" sz="1500" b="1" i="0" u="none" strike="noStrike" kern="1200" cap="none" spc="0" normalizeH="0" baseline="0" noProof="0" dirty="0">
+                  <a:ln>
+                    <a:noFill/>
+                  </a:ln>
+                  <a:solidFill>
+                    <a:prstClr val="white"/>
+                  </a:solidFill>
+                  <a:effectLst>
+                    <a:outerShdw blurRad="38100" dist="76200" dir="2700000" algn="tl">
+                      <a:srgbClr val="000000"/>
+                    </a:outerShdw>
+                  </a:effectLst>
+                  <a:uLnTx/>
+                  <a:uFillTx/>
+                  <a:latin typeface="Helvetica" panose="020B0604020202030204" pitchFamily="34" charset="0"/>
+                  <a:ea typeface="+mn-ea"/>
+                  <a:cs typeface="+mn-cs"/>
+                </a:rPr>
+                <a:t>Développement</a:t>
+              </a:r>
+            </a:p>
+          </p:txBody>
+        </p:sp>
+        <p:sp>
+          <p:nvSpPr>
+            <p:cNvPr id="19" name="Flèche : chevron 18">
+              <a:extLst>
+                <a:ext uri="{FF2B5EF4-FFF2-40B4-BE49-F238E27FC236}">
+                  <a16:creationId xmlns:a16="http://schemas.microsoft.com/office/drawing/2014/main" id="{8795E004-010B-4219-8B10-37FA6D3A7781}"/>
+                </a:ext>
+              </a:extLst>
+            </p:cNvPr>
+            <p:cNvSpPr/>
+            <p:nvPr/>
+          </p:nvSpPr>
+          <p:spPr>
+            <a:xfrm>
+              <a:off x="7268850" y="332703"/>
+              <a:ext cx="2309567" cy="688157"/>
+            </a:xfrm>
+            <a:prstGeom prst="chevron">
+              <a:avLst/>
+            </a:prstGeom>
+            <a:solidFill>
+              <a:srgbClr val="FED449"/>
+            </a:solidFill>
+            <a:ln>
+              <a:solidFill>
+                <a:schemeClr val="bg1"/>
+              </a:solidFill>
+            </a:ln>
+          </p:spPr>
+          <p:style>
+            <a:lnRef idx="2">
+              <a:schemeClr val="accent1">
+                <a:shade val="50000"/>
+              </a:schemeClr>
+            </a:lnRef>
+            <a:fillRef idx="1">
+              <a:schemeClr val="accent1"/>
+            </a:fillRef>
+            <a:effectRef idx="0">
+              <a:schemeClr val="accent1"/>
+            </a:effectRef>
+            <a:fontRef idx="minor">
+              <a:schemeClr val="lt1"/>
+            </a:fontRef>
+          </p:style>
+          <p:txBody>
+            <a:bodyPr rtlCol="0" anchor="ctr"/>
+            <a:lstStyle/>
+            <a:p>
+              <a:pPr marL="0" marR="0" lvl="0" indent="0" algn="ctr" defTabSz="914400" rtl="0" eaLnBrk="1" fontAlgn="auto" latinLnBrk="0" hangingPunct="1">
+                <a:lnSpc>
+                  <a:spcPct val="100000"/>
+                </a:lnSpc>
+                <a:spcBef>
+                  <a:spcPts val="0"/>
+                </a:spcBef>
+                <a:spcAft>
+                  <a:spcPts val="0"/>
+                </a:spcAft>
+                <a:buClrTx/>
+                <a:buSzTx/>
+                <a:buFontTx/>
+                <a:buNone/>
+                <a:tabLst/>
+                <a:defRPr/>
+              </a:pPr>
+              <a:r>
+                <a:rPr kumimoji="0" lang="fr-FR" sz="1500" b="1" i="0" u="none" strike="noStrike" kern="1200" cap="none" spc="0" normalizeH="0" baseline="0" noProof="0" dirty="0">
+                  <a:ln>
+                    <a:noFill/>
+                  </a:ln>
+                  <a:solidFill>
+                    <a:prstClr val="white"/>
+                  </a:solidFill>
+                  <a:effectLst>
+                    <a:outerShdw blurRad="38100" dist="76200" dir="2700000" algn="tl">
+                      <a:srgbClr val="000000"/>
+                    </a:outerShdw>
+                  </a:effectLst>
+                  <a:uLnTx/>
+                  <a:uFillTx/>
+                  <a:latin typeface="Helvetica" panose="020B0604020202030204" pitchFamily="34" charset="0"/>
+                  <a:ea typeface="+mn-ea"/>
+                  <a:cs typeface="+mn-cs"/>
+                </a:rPr>
+                <a:t>Démonstration</a:t>
+              </a:r>
+              <a:endParaRPr kumimoji="0" lang="fr-FR" sz="1500" b="0" i="0" u="none" strike="noStrike" kern="1200" cap="none" spc="0" normalizeH="0" baseline="0" noProof="0" dirty="0">
+                <a:ln>
+                  <a:noFill/>
+                </a:ln>
+                <a:solidFill>
+                  <a:prstClr val="black"/>
+                </a:solidFill>
+                <a:effectLst/>
+                <a:uLnTx/>
+                <a:uFillTx/>
+                <a:latin typeface="Calibri" panose="020F0502020204030204"/>
+                <a:ea typeface="+mn-ea"/>
+                <a:cs typeface="+mn-cs"/>
+              </a:endParaRPr>
+            </a:p>
+          </p:txBody>
+        </p:sp>
+        <p:pic>
+          <p:nvPicPr>
+            <p:cNvPr id="6" name="Image 5">
+              <a:extLst>
+                <a:ext uri="{FF2B5EF4-FFF2-40B4-BE49-F238E27FC236}">
+                  <a16:creationId xmlns:a16="http://schemas.microsoft.com/office/drawing/2014/main" id="{2D0A881D-5AC2-4766-BD4C-5405D55C11A5}"/>
+                </a:ext>
+              </a:extLst>
+            </p:cNvPr>
+            <p:cNvPicPr>
+              <a:picLocks noChangeAspect="1"/>
+            </p:cNvPicPr>
+            <p:nvPr/>
+          </p:nvPicPr>
+          <p:blipFill>
+            <a:blip r:embed="rId3">
+              <a:extLst>
+                <a:ext uri="{28A0092B-C50C-407E-A947-70E740481C1C}">
+                  <a14:useLocalDpi xmlns:a14="http://schemas.microsoft.com/office/drawing/2010/main" val="0"/>
+                </a:ext>
+              </a:extLst>
+            </a:blip>
+            <a:stretch>
+              <a:fillRect/>
+            </a:stretch>
+          </p:blipFill>
+          <p:spPr>
+            <a:xfrm>
+              <a:off x="327166" y="0"/>
+              <a:ext cx="1566153" cy="1342417"/>
+            </a:xfrm>
+            <a:prstGeom prst="rect">
+              <a:avLst/>
+            </a:prstGeom>
+          </p:spPr>
+        </p:pic>
+      </p:grpSp>
+      <p:sp>
+        <p:nvSpPr>
+          <p:cNvPr id="10" name="ZoneTexte 9">
+            <a:extLst>
+              <a:ext uri="{FF2B5EF4-FFF2-40B4-BE49-F238E27FC236}">
+                <a16:creationId xmlns:a16="http://schemas.microsoft.com/office/drawing/2014/main" id="{CE36D8FB-1CD3-4D19-A954-A2CE97724692}"/>
+              </a:ext>
+            </a:extLst>
+          </p:cNvPr>
+          <p:cNvSpPr txBox="1"/>
+          <p:nvPr/>
+        </p:nvSpPr>
+        <p:spPr>
+          <a:xfrm>
+            <a:off x="336894" y="1225685"/>
+            <a:ext cx="11472482" cy="5369668"/>
+          </a:xfrm>
+          <a:prstGeom prst="rect">
+            <a:avLst/>
+          </a:prstGeom>
+          <a:solidFill>
+            <a:srgbClr val="FED449">
+              <a:alpha val="50000"/>
+            </a:srgbClr>
+          </a:solidFill>
+          <a:effectLst>
+            <a:softEdge rad="152400"/>
+          </a:effectLst>
+        </p:spPr>
+        <p:txBody>
+          <a:bodyPr wrap="square" rtlCol="0">
+            <a:spAutoFit/>
+          </a:bodyPr>
+          <a:lstStyle/>
+          <a:p>
+            <a:pPr marL="0" marR="0" lvl="0" indent="0" algn="l" defTabSz="914400" rtl="0" eaLnBrk="1" fontAlgn="auto" latinLnBrk="0" hangingPunct="1">
+              <a:lnSpc>
+                <a:spcPct val="100000"/>
+              </a:lnSpc>
+              <a:spcBef>
+                <a:spcPts val="0"/>
+              </a:spcBef>
+              <a:spcAft>
+                <a:spcPts val="0"/>
+              </a:spcAft>
+              <a:buClrTx/>
+              <a:buSzTx/>
+              <a:buFontTx/>
+              <a:buNone/>
+              <a:tabLst/>
+              <a:defRPr/>
+            </a:pPr>
+            <a:endParaRPr kumimoji="0" lang="fr-FR" sz="1800" b="0" i="0" u="none" strike="noStrike" kern="1200" cap="none" spc="0" normalizeH="0" baseline="0" noProof="0" dirty="0">
+              <a:ln>
+                <a:noFill/>
+              </a:ln>
+              <a:solidFill>
+                <a:prstClr val="black"/>
+              </a:solidFill>
+              <a:effectLst/>
+              <a:uLnTx/>
+              <a:uFillTx/>
+              <a:latin typeface="Calibri" panose="020F0502020204030204"/>
+              <a:ea typeface="+mn-ea"/>
+              <a:cs typeface="+mn-cs"/>
+            </a:endParaRPr>
+          </a:p>
+        </p:txBody>
+      </p:sp>
+      <p:sp>
+        <p:nvSpPr>
+          <p:cNvPr id="2" name="ZoneTexte 1">
+            <a:extLst>
+              <a:ext uri="{FF2B5EF4-FFF2-40B4-BE49-F238E27FC236}">
+                <a16:creationId xmlns:a16="http://schemas.microsoft.com/office/drawing/2014/main" id="{40B2DBE0-4B31-4A4D-80D2-BF8EE6286B82}"/>
+              </a:ext>
+            </a:extLst>
+          </p:cNvPr>
+          <p:cNvSpPr txBox="1"/>
+          <p:nvPr/>
+        </p:nvSpPr>
+        <p:spPr>
+          <a:xfrm>
+            <a:off x="1090367" y="1674695"/>
+            <a:ext cx="10011266" cy="800219"/>
+          </a:xfrm>
+          <a:prstGeom prst="rect">
+            <a:avLst/>
+          </a:prstGeom>
+          <a:noFill/>
+        </p:spPr>
+        <p:txBody>
+          <a:bodyPr wrap="square" rtlCol="0">
+            <a:spAutoFit/>
+          </a:bodyPr>
+          <a:lstStyle/>
+          <a:p>
+            <a:pPr marL="0" marR="0" lvl="0" indent="0" algn="l" defTabSz="914400" rtl="0" eaLnBrk="1" fontAlgn="auto" latinLnBrk="0" hangingPunct="1">
+              <a:lnSpc>
+                <a:spcPct val="100000"/>
+              </a:lnSpc>
+              <a:spcBef>
+                <a:spcPts val="0"/>
+              </a:spcBef>
+              <a:spcAft>
+                <a:spcPts val="0"/>
+              </a:spcAft>
+              <a:buClrTx/>
+              <a:buSzTx/>
+              <a:buFontTx/>
+              <a:buNone/>
+              <a:tabLst/>
+              <a:defRPr/>
+            </a:pPr>
+            <a:r>
+              <a:rPr kumimoji="0" lang="fr-FR" sz="2800" b="1" i="0" u="none" strike="noStrike" kern="1200" cap="none" spc="0" normalizeH="0" baseline="0" noProof="0" dirty="0">
+                <a:ln>
+                  <a:noFill/>
+                </a:ln>
+                <a:solidFill>
+                  <a:prstClr val="black"/>
+                </a:solidFill>
+                <a:effectLst/>
+                <a:uLnTx/>
+                <a:uFillTx/>
+                <a:latin typeface="Helvetica" panose="020B0604020202030204" pitchFamily="34" charset="0"/>
+                <a:ea typeface="+mn-ea"/>
+                <a:cs typeface="Arial" panose="020B0604020202020204" pitchFamily="34" charset="0"/>
+              </a:rPr>
+              <a:t>MCD</a:t>
+            </a:r>
+          </a:p>
+          <a:p>
+            <a:pPr marL="0" marR="0" lvl="0" indent="0" algn="l" defTabSz="914400" rtl="0" eaLnBrk="1" fontAlgn="auto" latinLnBrk="0" hangingPunct="1">
+              <a:lnSpc>
+                <a:spcPct val="100000"/>
+              </a:lnSpc>
+              <a:spcBef>
+                <a:spcPts val="0"/>
+              </a:spcBef>
+              <a:spcAft>
+                <a:spcPts val="0"/>
+              </a:spcAft>
+              <a:buClrTx/>
+              <a:buSzTx/>
+              <a:buFontTx/>
+              <a:buNone/>
+              <a:tabLst/>
+              <a:defRPr/>
+            </a:pPr>
+            <a:endParaRPr kumimoji="0" lang="fr-FR" sz="1800" b="0" i="0" u="none" strike="noStrike" kern="1200" cap="none" spc="0" normalizeH="0" baseline="0" noProof="0" dirty="0">
+              <a:ln>
+                <a:noFill/>
+              </a:ln>
+              <a:solidFill>
+                <a:prstClr val="black"/>
+              </a:solidFill>
+              <a:effectLst/>
+              <a:uLnTx/>
+              <a:uFillTx/>
+              <a:latin typeface="Calibri" panose="020F0502020204030204"/>
+              <a:ea typeface="+mn-ea"/>
+              <a:cs typeface="+mn-cs"/>
+            </a:endParaRPr>
+          </a:p>
+        </p:txBody>
+      </p:sp>
+      <p:pic>
+        <p:nvPicPr>
+          <p:cNvPr id="5" name="Image 4" descr="JMerise : C:\Users\etudiant12\Desktop\notre_mcd.mcd">
+            <a:extLst>
+              <a:ext uri="{FF2B5EF4-FFF2-40B4-BE49-F238E27FC236}">
+                <a16:creationId xmlns:a16="http://schemas.microsoft.com/office/drawing/2014/main" id="{F75013E0-4C5F-4CF5-9F80-FD4F9E0B926C}"/>
+              </a:ext>
+            </a:extLst>
+          </p:cNvPr>
+          <p:cNvPicPr>
+            <a:picLocks noChangeAspect="1"/>
+          </p:cNvPicPr>
+          <p:nvPr/>
+        </p:nvPicPr>
+        <p:blipFill rotWithShape="1">
+          <a:blip r:embed="rId4">
+            <a:extLst>
+              <a:ext uri="{28A0092B-C50C-407E-A947-70E740481C1C}">
+                <a14:useLocalDpi xmlns:a14="http://schemas.microsoft.com/office/drawing/2010/main" val="0"/>
+              </a:ext>
+            </a:extLst>
+          </a:blip>
+          <a:srcRect l="16614" t="14607" r="13412" b="41357"/>
+          <a:stretch/>
+        </p:blipFill>
+        <p:spPr>
+          <a:xfrm>
+            <a:off x="1172452" y="2444277"/>
+            <a:ext cx="9801366" cy="3335483"/>
+          </a:xfrm>
+          <a:prstGeom prst="rect">
+            <a:avLst/>
+          </a:prstGeom>
+        </p:spPr>
+      </p:pic>
+    </p:spTree>
+    <p:extLst>
+      <p:ext uri="{BB962C8B-B14F-4D97-AF65-F5344CB8AC3E}">
+        <p14:creationId xmlns:p14="http://schemas.microsoft.com/office/powerpoint/2010/main" val="557283206"/>
+      </p:ext>
+    </p:extLst>
+  </p:cSld>
+  <p:clrMapOvr>
+    <a:masterClrMapping/>
+  </p:clrMapOvr>
+</p:sld>
+</file>
+
+<file path=ppt/slides/slide7.xml><?xml version="1.0" encoding="utf-8"?>
+<p:sld xmlns:a="http://schemas.openxmlformats.org/drawingml/2006/main" xmlns:r="http://schemas.openxmlformats.org/officeDocument/2006/relationships" xmlns:p="http://schemas.openxmlformats.org/presentationml/2006/main">
+  <p:cSld>
+    <p:bg>
+      <p:bgPr>
+        <a:blipFill dpi="0" rotWithShape="1">
+          <a:blip r:embed="rId2">
+            <a:lum/>
+          </a:blip>
+          <a:srcRect/>
+          <a:stretch>
+            <a:fillRect/>
+          </a:stretch>
+        </a:blipFill>
+        <a:effectLst/>
+      </p:bgPr>
+    </p:bg>
+    <p:spTree>
+      <p:nvGrpSpPr>
+        <p:cNvPr id="1" name=""/>
+        <p:cNvGrpSpPr/>
+        <p:nvPr/>
+      </p:nvGrpSpPr>
+      <p:grpSpPr>
+        <a:xfrm>
+          <a:off x="0" y="0"/>
+          <a:ext cx="0" cy="0"/>
+          <a:chOff x="0" y="0"/>
+          <a:chExt cx="0" cy="0"/>
+        </a:xfrm>
+      </p:grpSpPr>
+      <p:grpSp>
+        <p:nvGrpSpPr>
+          <p:cNvPr id="7" name="Groupe 6">
+            <a:extLst>
+              <a:ext uri="{FF2B5EF4-FFF2-40B4-BE49-F238E27FC236}">
+                <a16:creationId xmlns:a16="http://schemas.microsoft.com/office/drawing/2014/main" id="{67E81936-583F-45AD-82CC-A5C937F4C87C}"/>
+              </a:ext>
+            </a:extLst>
+          </p:cNvPr>
+          <p:cNvGrpSpPr/>
+          <p:nvPr/>
+        </p:nvGrpSpPr>
+        <p:grpSpPr>
+          <a:xfrm>
+            <a:off x="327166" y="0"/>
+            <a:ext cx="11251304" cy="1342417"/>
+            <a:chOff x="327166" y="0"/>
+            <a:chExt cx="11251304" cy="1342417"/>
+          </a:xfrm>
+        </p:grpSpPr>
+        <p:sp>
+          <p:nvSpPr>
+            <p:cNvPr id="4" name="Flèche : chevron 3">
+              <a:extLst>
+                <a:ext uri="{FF2B5EF4-FFF2-40B4-BE49-F238E27FC236}">
+                  <a16:creationId xmlns:a16="http://schemas.microsoft.com/office/drawing/2014/main" id="{60D600DE-6FA0-4280-A81A-6DBE7691E92C}"/>
+                </a:ext>
+              </a:extLst>
+            </p:cNvPr>
+            <p:cNvSpPr/>
+            <p:nvPr/>
+          </p:nvSpPr>
+          <p:spPr>
+            <a:xfrm>
+              <a:off x="1268691" y="332278"/>
+              <a:ext cx="2309567" cy="688157"/>
+            </a:xfrm>
+            <a:prstGeom prst="chevron">
+              <a:avLst/>
+            </a:prstGeom>
+            <a:solidFill>
+              <a:srgbClr val="FED449"/>
+            </a:solidFill>
+            <a:ln>
+              <a:solidFill>
+                <a:schemeClr val="bg1"/>
+              </a:solidFill>
+            </a:ln>
+          </p:spPr>
+          <p:style>
+            <a:lnRef idx="2">
+              <a:schemeClr val="accent1">
+                <a:shade val="50000"/>
+              </a:schemeClr>
+            </a:lnRef>
+            <a:fillRef idx="1">
+              <a:schemeClr val="accent1"/>
+            </a:fillRef>
+            <a:effectRef idx="0">
+              <a:schemeClr val="accent1"/>
+            </a:effectRef>
+            <a:fontRef idx="minor">
+              <a:schemeClr val="lt1"/>
+            </a:fontRef>
+          </p:style>
+          <p:txBody>
+            <a:bodyPr rtlCol="0" anchor="ctr"/>
+            <a:lstStyle/>
+            <a:p>
               <a:pPr algn="ctr"/>
               <a:r>
                 <a:rPr lang="fr-FR" sz="1500" b="1" dirty="0">
@@ -22005,7 +22772,7 @@
               <a:avLst/>
             </a:prstGeom>
             <a:solidFill>
-              <a:srgbClr val="FED449"/>
+              <a:srgbClr val="88CE62"/>
             </a:solidFill>
             <a:ln>
               <a:solidFill>
@@ -22281,527 +23048,6 @@
         <p:spPr>
           <a:xfrm>
             <a:off x="1090367" y="1674695"/>
-            <a:ext cx="10011266" cy="800219"/>
-          </a:xfrm>
-          <a:prstGeom prst="rect">
-            <a:avLst/>
-          </a:prstGeom>
-          <a:noFill/>
-        </p:spPr>
-        <p:txBody>
-          <a:bodyPr wrap="square" rtlCol="0">
-            <a:spAutoFit/>
-          </a:bodyPr>
-          <a:lstStyle/>
-          <a:p>
-            <a:r>
-              <a:rPr lang="fr-FR" sz="2800" b="1" dirty="0">
-                <a:latin typeface="Helvetica" panose="020B0604020202030204" pitchFamily="34" charset="0"/>
-                <a:cs typeface="Arial" panose="020B0604020202020204" pitchFamily="34" charset="0"/>
-              </a:rPr>
-              <a:t>MCD</a:t>
-            </a:r>
-          </a:p>
-          <a:p>
-            <a:endParaRPr lang="fr-FR" dirty="0"/>
-          </a:p>
-        </p:txBody>
-      </p:sp>
-    </p:spTree>
-    <p:extLst>
-      <p:ext uri="{BB962C8B-B14F-4D97-AF65-F5344CB8AC3E}">
-        <p14:creationId xmlns:p14="http://schemas.microsoft.com/office/powerpoint/2010/main" val="1408283683"/>
-      </p:ext>
-    </p:extLst>
-  </p:cSld>
-  <p:clrMapOvr>
-    <a:masterClrMapping/>
-  </p:clrMapOvr>
-</p:sld>
-</file>
-
-<file path=ppt/slides/slide7.xml><?xml version="1.0" encoding="utf-8"?>
-<p:sld xmlns:a="http://schemas.openxmlformats.org/drawingml/2006/main" xmlns:r="http://schemas.openxmlformats.org/officeDocument/2006/relationships" xmlns:p="http://schemas.openxmlformats.org/presentationml/2006/main">
-  <p:cSld>
-    <p:bg>
-      <p:bgPr>
-        <a:blipFill dpi="0" rotWithShape="1">
-          <a:blip r:embed="rId2">
-            <a:lum/>
-          </a:blip>
-          <a:srcRect/>
-          <a:stretch>
-            <a:fillRect/>
-          </a:stretch>
-        </a:blipFill>
-        <a:effectLst/>
-      </p:bgPr>
-    </p:bg>
-    <p:spTree>
-      <p:nvGrpSpPr>
-        <p:cNvPr id="1" name=""/>
-        <p:cNvGrpSpPr/>
-        <p:nvPr/>
-      </p:nvGrpSpPr>
-      <p:grpSpPr>
-        <a:xfrm>
-          <a:off x="0" y="0"/>
-          <a:ext cx="0" cy="0"/>
-          <a:chOff x="0" y="0"/>
-          <a:chExt cx="0" cy="0"/>
-        </a:xfrm>
-      </p:grpSpPr>
-      <p:grpSp>
-        <p:nvGrpSpPr>
-          <p:cNvPr id="7" name="Groupe 6">
-            <a:extLst>
-              <a:ext uri="{FF2B5EF4-FFF2-40B4-BE49-F238E27FC236}">
-                <a16:creationId xmlns:a16="http://schemas.microsoft.com/office/drawing/2014/main" id="{67E81936-583F-45AD-82CC-A5C937F4C87C}"/>
-              </a:ext>
-            </a:extLst>
-          </p:cNvPr>
-          <p:cNvGrpSpPr/>
-          <p:nvPr/>
-        </p:nvGrpSpPr>
-        <p:grpSpPr>
-          <a:xfrm>
-            <a:off x="327166" y="0"/>
-            <a:ext cx="11251304" cy="1342417"/>
-            <a:chOff x="327166" y="0"/>
-            <a:chExt cx="11251304" cy="1342417"/>
-          </a:xfrm>
-        </p:grpSpPr>
-        <p:sp>
-          <p:nvSpPr>
-            <p:cNvPr id="4" name="Flèche : chevron 3">
-              <a:extLst>
-                <a:ext uri="{FF2B5EF4-FFF2-40B4-BE49-F238E27FC236}">
-                  <a16:creationId xmlns:a16="http://schemas.microsoft.com/office/drawing/2014/main" id="{60D600DE-6FA0-4280-A81A-6DBE7691E92C}"/>
-                </a:ext>
-              </a:extLst>
-            </p:cNvPr>
-            <p:cNvSpPr/>
-            <p:nvPr/>
-          </p:nvSpPr>
-          <p:spPr>
-            <a:xfrm>
-              <a:off x="1268691" y="332278"/>
-              <a:ext cx="2309567" cy="688157"/>
-            </a:xfrm>
-            <a:prstGeom prst="chevron">
-              <a:avLst/>
-            </a:prstGeom>
-            <a:solidFill>
-              <a:srgbClr val="FED449"/>
-            </a:solidFill>
-            <a:ln>
-              <a:solidFill>
-                <a:schemeClr val="bg1"/>
-              </a:solidFill>
-            </a:ln>
-          </p:spPr>
-          <p:style>
-            <a:lnRef idx="2">
-              <a:schemeClr val="accent1">
-                <a:shade val="50000"/>
-              </a:schemeClr>
-            </a:lnRef>
-            <a:fillRef idx="1">
-              <a:schemeClr val="accent1"/>
-            </a:fillRef>
-            <a:effectRef idx="0">
-              <a:schemeClr val="accent1"/>
-            </a:effectRef>
-            <a:fontRef idx="minor">
-              <a:schemeClr val="lt1"/>
-            </a:fontRef>
-          </p:style>
-          <p:txBody>
-            <a:bodyPr rtlCol="0" anchor="ctr"/>
-            <a:lstStyle/>
-            <a:p>
-              <a:pPr algn="ctr"/>
-              <a:r>
-                <a:rPr lang="fr-FR" sz="1500" b="1" dirty="0">
-                  <a:solidFill>
-                    <a:schemeClr val="bg1"/>
-                  </a:solidFill>
-                  <a:effectLst>
-                    <a:outerShdw blurRad="38100" dist="76200" dir="2700000" algn="tl">
-                      <a:srgbClr val="000000"/>
-                    </a:outerShdw>
-                  </a:effectLst>
-                  <a:latin typeface="Helvetica" panose="020B0604020202030204" pitchFamily="34" charset="0"/>
-                </a:rPr>
-                <a:t>Etude du projet</a:t>
-              </a:r>
-            </a:p>
-          </p:txBody>
-        </p:sp>
-        <p:sp>
-          <p:nvSpPr>
-            <p:cNvPr id="16" name="Flèche : chevron 15">
-              <a:extLst>
-                <a:ext uri="{FF2B5EF4-FFF2-40B4-BE49-F238E27FC236}">
-                  <a16:creationId xmlns:a16="http://schemas.microsoft.com/office/drawing/2014/main" id="{F7655D32-22EC-4542-883E-4033865C1471}"/>
-                </a:ext>
-              </a:extLst>
-            </p:cNvPr>
-            <p:cNvSpPr/>
-            <p:nvPr/>
-          </p:nvSpPr>
-          <p:spPr>
-            <a:xfrm>
-              <a:off x="9268903" y="332277"/>
-              <a:ext cx="2309567" cy="688157"/>
-            </a:xfrm>
-            <a:prstGeom prst="chevron">
-              <a:avLst/>
-            </a:prstGeom>
-            <a:solidFill>
-              <a:srgbClr val="FED449"/>
-            </a:solidFill>
-            <a:ln>
-              <a:solidFill>
-                <a:schemeClr val="bg1"/>
-              </a:solidFill>
-            </a:ln>
-          </p:spPr>
-          <p:style>
-            <a:lnRef idx="2">
-              <a:schemeClr val="accent1">
-                <a:shade val="50000"/>
-              </a:schemeClr>
-            </a:lnRef>
-            <a:fillRef idx="1">
-              <a:schemeClr val="accent1"/>
-            </a:fillRef>
-            <a:effectRef idx="0">
-              <a:schemeClr val="accent1"/>
-            </a:effectRef>
-            <a:fontRef idx="minor">
-              <a:schemeClr val="lt1"/>
-            </a:fontRef>
-          </p:style>
-          <p:txBody>
-            <a:bodyPr rtlCol="0" anchor="ctr"/>
-            <a:lstStyle/>
-            <a:p>
-              <a:pPr algn="ctr"/>
-              <a:r>
-                <a:rPr lang="fr-FR" sz="1600" b="1" dirty="0">
-                  <a:solidFill>
-                    <a:schemeClr val="bg1"/>
-                  </a:solidFill>
-                  <a:effectLst>
-                    <a:outerShdw blurRad="38100" dist="76200" dir="2700000" algn="tl">
-                      <a:srgbClr val="000000"/>
-                    </a:outerShdw>
-                  </a:effectLst>
-                  <a:latin typeface="Helvetica" panose="020B0604020202030204" pitchFamily="34" charset="0"/>
-                </a:rPr>
-                <a:t>Conclusion</a:t>
-              </a:r>
-            </a:p>
-          </p:txBody>
-        </p:sp>
-        <p:sp>
-          <p:nvSpPr>
-            <p:cNvPr id="17" name="Flèche : chevron 16">
-              <a:extLst>
-                <a:ext uri="{FF2B5EF4-FFF2-40B4-BE49-F238E27FC236}">
-                  <a16:creationId xmlns:a16="http://schemas.microsoft.com/office/drawing/2014/main" id="{30C36617-CB5C-40F8-B05D-7053886FD5EF}"/>
-                </a:ext>
-              </a:extLst>
-            </p:cNvPr>
-            <p:cNvSpPr/>
-            <p:nvPr/>
-          </p:nvSpPr>
-          <p:spPr>
-            <a:xfrm>
-              <a:off x="3268744" y="332277"/>
-              <a:ext cx="2309567" cy="688157"/>
-            </a:xfrm>
-            <a:prstGeom prst="chevron">
-              <a:avLst/>
-            </a:prstGeom>
-            <a:solidFill>
-              <a:srgbClr val="88CE62"/>
-            </a:solidFill>
-            <a:ln>
-              <a:solidFill>
-                <a:schemeClr val="bg1"/>
-              </a:solidFill>
-            </a:ln>
-          </p:spPr>
-          <p:style>
-            <a:lnRef idx="2">
-              <a:schemeClr val="accent1">
-                <a:shade val="50000"/>
-              </a:schemeClr>
-            </a:lnRef>
-            <a:fillRef idx="1">
-              <a:schemeClr val="accent1"/>
-            </a:fillRef>
-            <a:effectRef idx="0">
-              <a:schemeClr val="accent1"/>
-            </a:effectRef>
-            <a:fontRef idx="minor">
-              <a:schemeClr val="lt1"/>
-            </a:fontRef>
-          </p:style>
-          <p:txBody>
-            <a:bodyPr rtlCol="0" anchor="ctr"/>
-            <a:lstStyle/>
-            <a:p>
-              <a:pPr algn="ctr"/>
-              <a:r>
-                <a:rPr lang="fr-FR" sz="1500" b="1" dirty="0">
-                  <a:solidFill>
-                    <a:schemeClr val="bg1"/>
-                  </a:solidFill>
-                  <a:effectLst>
-                    <a:outerShdw blurRad="38100" dist="76200" dir="2700000" algn="tl">
-                      <a:srgbClr val="000000"/>
-                    </a:outerShdw>
-                  </a:effectLst>
-                  <a:latin typeface="Helvetica" panose="020B0604020202030204" pitchFamily="34" charset="0"/>
-                </a:rPr>
-                <a:t>Organisation</a:t>
-              </a:r>
-            </a:p>
-          </p:txBody>
-        </p:sp>
-        <p:sp>
-          <p:nvSpPr>
-            <p:cNvPr id="18" name="Flèche : chevron 17">
-              <a:extLst>
-                <a:ext uri="{FF2B5EF4-FFF2-40B4-BE49-F238E27FC236}">
-                  <a16:creationId xmlns:a16="http://schemas.microsoft.com/office/drawing/2014/main" id="{A33478E5-51C7-4324-9E5C-0845E032CF0C}"/>
-                </a:ext>
-              </a:extLst>
-            </p:cNvPr>
-            <p:cNvSpPr/>
-            <p:nvPr/>
-          </p:nvSpPr>
-          <p:spPr>
-            <a:xfrm>
-              <a:off x="5268797" y="332704"/>
-              <a:ext cx="2309567" cy="688157"/>
-            </a:xfrm>
-            <a:prstGeom prst="chevron">
-              <a:avLst/>
-            </a:prstGeom>
-            <a:solidFill>
-              <a:srgbClr val="FED449"/>
-            </a:solidFill>
-            <a:ln>
-              <a:solidFill>
-                <a:schemeClr val="bg1"/>
-              </a:solidFill>
-            </a:ln>
-          </p:spPr>
-          <p:style>
-            <a:lnRef idx="2">
-              <a:schemeClr val="accent1">
-                <a:shade val="50000"/>
-              </a:schemeClr>
-            </a:lnRef>
-            <a:fillRef idx="1">
-              <a:schemeClr val="accent1"/>
-            </a:fillRef>
-            <a:effectRef idx="0">
-              <a:schemeClr val="accent1"/>
-            </a:effectRef>
-            <a:fontRef idx="minor">
-              <a:schemeClr val="lt1"/>
-            </a:fontRef>
-          </p:style>
-          <p:txBody>
-            <a:bodyPr rtlCol="0" anchor="ctr"/>
-            <a:lstStyle/>
-            <a:p>
-              <a:pPr algn="ctr"/>
-              <a:r>
-                <a:rPr lang="fr-FR" sz="1500" b="1" dirty="0">
-                  <a:solidFill>
-                    <a:schemeClr val="bg1"/>
-                  </a:solidFill>
-                  <a:effectLst>
-                    <a:outerShdw blurRad="38100" dist="76200" dir="2700000" algn="tl">
-                      <a:srgbClr val="000000"/>
-                    </a:outerShdw>
-                  </a:effectLst>
-                  <a:latin typeface="Helvetica" panose="020B0604020202030204" pitchFamily="34" charset="0"/>
-                </a:rPr>
-                <a:t>Développement</a:t>
-              </a:r>
-            </a:p>
-          </p:txBody>
-        </p:sp>
-        <p:sp>
-          <p:nvSpPr>
-            <p:cNvPr id="19" name="Flèche : chevron 18">
-              <a:extLst>
-                <a:ext uri="{FF2B5EF4-FFF2-40B4-BE49-F238E27FC236}">
-                  <a16:creationId xmlns:a16="http://schemas.microsoft.com/office/drawing/2014/main" id="{8795E004-010B-4219-8B10-37FA6D3A7781}"/>
-                </a:ext>
-              </a:extLst>
-            </p:cNvPr>
-            <p:cNvSpPr/>
-            <p:nvPr/>
-          </p:nvSpPr>
-          <p:spPr>
-            <a:xfrm>
-              <a:off x="7268850" y="332703"/>
-              <a:ext cx="2309567" cy="688157"/>
-            </a:xfrm>
-            <a:prstGeom prst="chevron">
-              <a:avLst/>
-            </a:prstGeom>
-            <a:solidFill>
-              <a:srgbClr val="FED449"/>
-            </a:solidFill>
-            <a:ln>
-              <a:solidFill>
-                <a:schemeClr val="bg1"/>
-              </a:solidFill>
-            </a:ln>
-          </p:spPr>
-          <p:style>
-            <a:lnRef idx="2">
-              <a:schemeClr val="accent1">
-                <a:shade val="50000"/>
-              </a:schemeClr>
-            </a:lnRef>
-            <a:fillRef idx="1">
-              <a:schemeClr val="accent1"/>
-            </a:fillRef>
-            <a:effectRef idx="0">
-              <a:schemeClr val="accent1"/>
-            </a:effectRef>
-            <a:fontRef idx="minor">
-              <a:schemeClr val="lt1"/>
-            </a:fontRef>
-          </p:style>
-          <p:txBody>
-            <a:bodyPr rtlCol="0" anchor="ctr"/>
-            <a:lstStyle/>
-            <a:p>
-              <a:pPr algn="ctr"/>
-              <a:r>
-                <a:rPr lang="fr-FR" sz="1500" b="1" dirty="0">
-                  <a:solidFill>
-                    <a:schemeClr val="bg1"/>
-                  </a:solidFill>
-                  <a:effectLst>
-                    <a:outerShdw blurRad="38100" dist="76200" dir="2700000" algn="tl">
-                      <a:srgbClr val="000000"/>
-                    </a:outerShdw>
-                  </a:effectLst>
-                  <a:latin typeface="Helvetica" panose="020B0604020202030204" pitchFamily="34" charset="0"/>
-                </a:rPr>
-                <a:t>Démonstration</a:t>
-              </a:r>
-              <a:endParaRPr lang="fr-FR" sz="1500" dirty="0">
-                <a:solidFill>
-                  <a:schemeClr val="tx1"/>
-                </a:solidFill>
-              </a:endParaRPr>
-            </a:p>
-          </p:txBody>
-        </p:sp>
-        <p:pic>
-          <p:nvPicPr>
-            <p:cNvPr id="6" name="Image 5">
-              <a:extLst>
-                <a:ext uri="{FF2B5EF4-FFF2-40B4-BE49-F238E27FC236}">
-                  <a16:creationId xmlns:a16="http://schemas.microsoft.com/office/drawing/2014/main" id="{2D0A881D-5AC2-4766-BD4C-5405D55C11A5}"/>
-                </a:ext>
-              </a:extLst>
-            </p:cNvPr>
-            <p:cNvPicPr>
-              <a:picLocks noChangeAspect="1"/>
-            </p:cNvPicPr>
-            <p:nvPr/>
-          </p:nvPicPr>
-          <p:blipFill>
-            <a:blip r:embed="rId3">
-              <a:extLst>
-                <a:ext uri="{28A0092B-C50C-407E-A947-70E740481C1C}">
-                  <a14:useLocalDpi xmlns:a14="http://schemas.microsoft.com/office/drawing/2010/main" val="0"/>
-                </a:ext>
-              </a:extLst>
-            </a:blip>
-            <a:stretch>
-              <a:fillRect/>
-            </a:stretch>
-          </p:blipFill>
-          <p:spPr>
-            <a:xfrm>
-              <a:off x="327166" y="0"/>
-              <a:ext cx="1566153" cy="1342417"/>
-            </a:xfrm>
-            <a:prstGeom prst="rect">
-              <a:avLst/>
-            </a:prstGeom>
-          </p:spPr>
-        </p:pic>
-      </p:grpSp>
-      <p:sp>
-        <p:nvSpPr>
-          <p:cNvPr id="10" name="ZoneTexte 9">
-            <a:extLst>
-              <a:ext uri="{FF2B5EF4-FFF2-40B4-BE49-F238E27FC236}">
-                <a16:creationId xmlns:a16="http://schemas.microsoft.com/office/drawing/2014/main" id="{CE36D8FB-1CD3-4D19-A954-A2CE97724692}"/>
-              </a:ext>
-            </a:extLst>
-          </p:cNvPr>
-          <p:cNvSpPr txBox="1"/>
-          <p:nvPr/>
-        </p:nvSpPr>
-        <p:spPr>
-          <a:xfrm>
-            <a:off x="336894" y="1225685"/>
-            <a:ext cx="11472482" cy="5369668"/>
-          </a:xfrm>
-          <a:prstGeom prst="rect">
-            <a:avLst/>
-          </a:prstGeom>
-          <a:solidFill>
-            <a:srgbClr val="FED449">
-              <a:alpha val="50000"/>
-            </a:srgbClr>
-          </a:solidFill>
-          <a:effectLst>
-            <a:softEdge rad="152400"/>
-          </a:effectLst>
-        </p:spPr>
-        <p:txBody>
-          <a:bodyPr wrap="square" rtlCol="0">
-            <a:spAutoFit/>
-          </a:bodyPr>
-          <a:lstStyle/>
-          <a:p>
-            <a:endParaRPr lang="fr-FR" dirty="0"/>
-          </a:p>
-        </p:txBody>
-      </p:sp>
-      <p:sp>
-        <p:nvSpPr>
-          <p:cNvPr id="2" name="ZoneTexte 1">
-            <a:extLst>
-              <a:ext uri="{FF2B5EF4-FFF2-40B4-BE49-F238E27FC236}">
-                <a16:creationId xmlns:a16="http://schemas.microsoft.com/office/drawing/2014/main" id="{40B2DBE0-4B31-4A4D-80D2-BF8EE6286B82}"/>
-              </a:ext>
-            </a:extLst>
-          </p:cNvPr>
-          <p:cNvSpPr txBox="1"/>
-          <p:nvPr/>
-        </p:nvSpPr>
-        <p:spPr>
-          <a:xfrm>
-            <a:off x="1090367" y="1674695"/>
             <a:ext cx="10011266" cy="4524315"/>
           </a:xfrm>
           <a:prstGeom prst="rect">
@@ -23419,7 +23665,7 @@
           <a:graphicData uri="http://schemas.openxmlformats.org/presentationml/2006/ole">
             <mc:AlternateContent xmlns:mc="http://schemas.openxmlformats.org/markup-compatibility/2006">
               <mc:Choice xmlns:v="urn:schemas-microsoft-com:vml" Requires="v">
-                <p:oleObj spid="_x0000_s1073" name="Worksheet" r:id="rId5" imgW="6865398" imgH="1562197" progId="Excel.Sheet.12">
+                <p:oleObj spid="_x0000_s1074" name="Worksheet" r:id="rId5" imgW="6865398" imgH="1562197" progId="Excel.Sheet.12">
                   <p:embed/>
                 </p:oleObj>
               </mc:Choice>

</xml_diff>

<commit_message>
JC - à Gilles
</commit_message>
<xml_diff>
--- a/DIAPO.pptx
+++ b/DIAPO.pptx
@@ -14551,7 +14551,19 @@
               <a:rPr lang="fr-FR" sz="2400" dirty="0">
                 <a:latin typeface="Helvetica" panose="020B0604020202030204" pitchFamily="34" charset="0"/>
               </a:rPr>
-              <a:t>Utiliser la méthode AGILE dès le début</a:t>
+              <a:t>Utiliser la méthode </a:t>
+            </a:r>
+            <a:r>
+              <a:rPr lang="fr-FR" sz="2400">
+                <a:latin typeface="Helvetica" panose="020B0604020202030204" pitchFamily="34" charset="0"/>
+              </a:rPr>
+              <a:t>à Gilles (AGILE) </a:t>
+            </a:r>
+            <a:r>
+              <a:rPr lang="fr-FR" sz="2400" dirty="0">
+                <a:latin typeface="Helvetica" panose="020B0604020202030204" pitchFamily="34" charset="0"/>
+              </a:rPr>
+              <a:t>dès le début</a:t>
             </a:r>
           </a:p>
           <a:p>
@@ -23655,7 +23667,7 @@
           <a:graphicData uri="http://schemas.openxmlformats.org/presentationml/2006/ole">
             <mc:AlternateContent xmlns:mc="http://schemas.openxmlformats.org/markup-compatibility/2006">
               <mc:Choice xmlns:v="urn:schemas-microsoft-com:vml" Requires="v">
-                <p:oleObj spid="_x0000_s1077" name="Worksheet" r:id="rId5" imgW="6865398" imgH="1562197" progId="Excel.Sheet.12">
+                <p:oleObj spid="_x0000_s1078" name="Worksheet" r:id="rId5" imgW="6865398" imgH="1562197" progId="Excel.Sheet.12">
                   <p:embed/>
                 </p:oleObj>
               </mc:Choice>

</xml_diff>